<commit_message>
modify styles and images.
</commit_message>
<xml_diff>
--- a/src/image_works/usage_guide.pptx
+++ b/src/image_works/usage_guide.pptx
@@ -3313,9 +3313,7 @@
           </a:prstGeom>
           <a:noFill/>
           <a:ln w="19050">
-            <a:solidFill>
-              <a:srgbClr val="354F9B"/>
-            </a:solidFill>
+            <a:noFill/>
           </a:ln>
         </p:spPr>
         <p:style>
@@ -3372,47 +3370,47 @@
           <a:lstStyle/>
           <a:p>
             <a:r>
-              <a:rPr kumimoji="1" lang="ja-JP" altLang="en-US" sz="1100" u="sng" dirty="0"/>
+              <a:rPr kumimoji="1" lang="ja-JP" altLang="en-US" sz="1050" u="sng" dirty="0"/>
               <a:t>産</a:t>
             </a:r>
             <a:r>
-              <a:rPr kumimoji="1" lang="ja-JP" altLang="en-US" sz="1100" dirty="0"/>
+              <a:rPr kumimoji="1" lang="ja-JP" altLang="en-US" sz="1050" dirty="0"/>
               <a:t>：産交バス</a:t>
             </a:r>
-            <a:endParaRPr kumimoji="1" lang="en-US" altLang="ja-JP" sz="1100" dirty="0"/>
-          </a:p>
-          <a:p>
-            <a:r>
-              <a:rPr kumimoji="1" lang="ja-JP" altLang="en-US" sz="1100" u="sng" dirty="0"/>
+            <a:endParaRPr kumimoji="1" lang="en-US" altLang="ja-JP" sz="1050" dirty="0"/>
+          </a:p>
+          <a:p>
+            <a:r>
+              <a:rPr kumimoji="1" lang="ja-JP" altLang="en-US" sz="1050" u="sng" dirty="0"/>
               <a:t>都</a:t>
             </a:r>
             <a:r>
-              <a:rPr kumimoji="1" lang="ja-JP" altLang="en-US" sz="1100" dirty="0"/>
+              <a:rPr kumimoji="1" lang="ja-JP" altLang="en-US" sz="1050" dirty="0"/>
               <a:t>：熊本都市バス</a:t>
             </a:r>
-            <a:endParaRPr kumimoji="1" lang="en-US" altLang="ja-JP" sz="1100" dirty="0"/>
-          </a:p>
-          <a:p>
-            <a:r>
-              <a:rPr kumimoji="1" lang="ja-JP" altLang="en-US" sz="1100" u="sng" dirty="0"/>
+            <a:endParaRPr kumimoji="1" lang="en-US" altLang="ja-JP" sz="1050" dirty="0"/>
+          </a:p>
+          <a:p>
+            <a:r>
+              <a:rPr kumimoji="1" lang="ja-JP" altLang="en-US" sz="1050" u="sng" dirty="0"/>
               <a:t>電</a:t>
             </a:r>
             <a:r>
-              <a:rPr kumimoji="1" lang="ja-JP" altLang="en-US" sz="1100" dirty="0"/>
+              <a:rPr kumimoji="1" lang="ja-JP" altLang="en-US" sz="1050" dirty="0"/>
               <a:t>：熊本電鉄バス</a:t>
             </a:r>
-            <a:endParaRPr kumimoji="1" lang="en-US" altLang="ja-JP" sz="1100" dirty="0"/>
-          </a:p>
-          <a:p>
-            <a:r>
-              <a:rPr kumimoji="1" lang="ja-JP" altLang="en-US" sz="1100" u="sng" dirty="0"/>
+            <a:endParaRPr kumimoji="1" lang="en-US" altLang="ja-JP" sz="1050" dirty="0"/>
+          </a:p>
+          <a:p>
+            <a:r>
+              <a:rPr kumimoji="1" lang="ja-JP" altLang="en-US" sz="1050" u="sng" dirty="0"/>
               <a:t>熊</a:t>
             </a:r>
             <a:r>
-              <a:rPr kumimoji="1" lang="ja-JP" altLang="en-US" sz="1100" dirty="0"/>
+              <a:rPr kumimoji="1" lang="ja-JP" altLang="en-US" sz="1050" dirty="0"/>
               <a:t>：熊本バス</a:t>
             </a:r>
-            <a:endParaRPr kumimoji="1" lang="en-US" altLang="ja-JP" sz="1100" dirty="0"/>
+            <a:endParaRPr kumimoji="1" lang="en-US" altLang="ja-JP" sz="1050" dirty="0"/>
           </a:p>
         </p:txBody>
       </p:sp>
@@ -3565,7 +3563,7 @@
         <p:spPr>
           <a:xfrm flipH="1" flipV="1">
             <a:off x="2899134" y="183343"/>
-            <a:ext cx="225377" cy="33485"/>
+            <a:ext cx="251260" cy="35732"/>
           </a:xfrm>
           <a:prstGeom prst="line">
             <a:avLst/>
@@ -3693,8 +3691,8 @@
         </p:nvCxnSpPr>
         <p:spPr>
           <a:xfrm flipH="1">
-            <a:off x="2857734" y="422276"/>
-            <a:ext cx="168594" cy="48194"/>
+            <a:off x="2855353" y="414338"/>
+            <a:ext cx="190266" cy="153763"/>
           </a:xfrm>
           <a:prstGeom prst="line">
             <a:avLst/>
@@ -3734,7 +3732,7 @@
         </p:nvSpPr>
         <p:spPr>
           <a:xfrm>
-            <a:off x="10974" y="10974"/>
+            <a:off x="47673" y="39868"/>
             <a:ext cx="548639" cy="315925"/>
           </a:xfrm>
           <a:prstGeom prst="rect">
@@ -3913,8 +3911,8 @@
         </p:nvSpPr>
         <p:spPr>
           <a:xfrm>
-            <a:off x="4457696" y="519113"/>
-            <a:ext cx="569387" cy="307007"/>
+            <a:off x="4544772" y="519113"/>
+            <a:ext cx="379605" cy="307007"/>
           </a:xfrm>
           <a:prstGeom prst="rect">
             <a:avLst/>
@@ -3922,8 +3920,8 @@
           <a:noFill/>
         </p:spPr>
         <p:txBody>
-          <a:bodyPr wrap="none" rtlCol="0">
-            <a:spAutoFit/>
+          <a:bodyPr wrap="none" lIns="0" rIns="0" rtlCol="0">
+            <a:noAutofit/>
           </a:bodyPr>
           <a:lstStyle/>
           <a:p>
@@ -3965,8 +3963,8 @@
         </p:nvSpPr>
         <p:spPr>
           <a:xfrm>
-            <a:off x="4323509" y="62939"/>
-            <a:ext cx="665567" cy="307007"/>
+            <a:off x="4391536" y="62939"/>
+            <a:ext cx="513792" cy="307007"/>
           </a:xfrm>
           <a:prstGeom prst="rect">
             <a:avLst/>
@@ -3974,8 +3972,8 @@
           <a:noFill/>
         </p:spPr>
         <p:txBody>
-          <a:bodyPr wrap="none" rtlCol="0">
-            <a:spAutoFit/>
+          <a:bodyPr wrap="none" lIns="0" rIns="0" rtlCol="0">
+            <a:noAutofit/>
           </a:bodyPr>
           <a:lstStyle/>
           <a:p>

</xml_diff>